<commit_message>
added front end jenkins
</commit_message>
<xml_diff>
--- a/Revature Standards/Presentation.pptx
+++ b/Revature Standards/Presentation.pptx
@@ -6006,7 +6006,6 @@
           <a:camera prst="orthographicFront"/>
           <a:lightRig rig="flat" dir="t"/>
         </a:scene3d>
-        <a:sp3d/>
       </dsp:spPr>
       <dsp:style>
         <a:lnRef idx="1">
@@ -38298,50 +38297,6 @@
       </p:sp>
       <p:sp>
         <p:nvSpPr>
-          <p:cNvPr id="3" name="Text Placeholder 2">
-            <a:extLst>
-              <a:ext uri="{FF2B5EF4-FFF2-40B4-BE49-F238E27FC236}">
-                <a16:creationId xmlns:a16="http://schemas.microsoft.com/office/drawing/2014/main" id="{C5D9F5A3-0B1E-46FE-B3F8-3296AD4711E8}"/>
-              </a:ext>
-            </a:extLst>
-          </p:cNvPr>
-          <p:cNvSpPr>
-            <a:spLocks noGrp="1"/>
-          </p:cNvSpPr>
-          <p:nvPr>
-            <p:ph type="body" idx="1"/>
-          </p:nvPr>
-        </p:nvSpPr>
-        <p:spPr/>
-        <p:txBody>
-          <a:bodyPr/>
-          <a:lstStyle/>
-          <a:p>
-            <a:r>
-              <a:rPr lang="de-DE" dirty="0"/>
-              <a:t>[Insert Jenkins </a:t>
-            </a:r>
-            <a:r>
-              <a:rPr lang="de-DE" dirty="0" err="1"/>
-              <a:t>info</a:t>
-            </a:r>
-            <a:r>
-              <a:rPr lang="de-DE" dirty="0"/>
-              <a:t> and </a:t>
-            </a:r>
-            <a:r>
-              <a:rPr lang="de-DE" dirty="0" err="1"/>
-              <a:t>visuals</a:t>
-            </a:r>
-            <a:r>
-              <a:rPr lang="de-DE" dirty="0"/>
-              <a:t>]</a:t>
-            </a:r>
-          </a:p>
-        </p:txBody>
-      </p:sp>
-      <p:sp>
-        <p:nvSpPr>
           <p:cNvPr id="4" name="Slide Number Placeholder 3">
             <a:extLst>
               <a:ext uri="{FF2B5EF4-FFF2-40B4-BE49-F238E27FC236}">
@@ -38378,6 +38333,36 @@
           </a:p>
         </p:txBody>
       </p:sp>
+      <p:pic>
+        <p:nvPicPr>
+          <p:cNvPr id="8" name="Picture 7">
+            <a:extLst>
+              <a:ext uri="{FF2B5EF4-FFF2-40B4-BE49-F238E27FC236}">
+                <a16:creationId xmlns:a16="http://schemas.microsoft.com/office/drawing/2014/main" id="{C439BBB7-AF83-45BA-A767-23474E22EFF3}"/>
+              </a:ext>
+            </a:extLst>
+          </p:cNvPr>
+          <p:cNvPicPr>
+            <a:picLocks noChangeAspect="1"/>
+          </p:cNvPicPr>
+          <p:nvPr/>
+        </p:nvPicPr>
+        <p:blipFill>
+          <a:blip r:embed="rId2"/>
+          <a:stretch>
+            <a:fillRect/>
+          </a:stretch>
+        </p:blipFill>
+        <p:spPr>
+          <a:xfrm>
+            <a:off x="221424" y="2465382"/>
+            <a:ext cx="8701152" cy="2350288"/>
+          </a:xfrm>
+          <a:prstGeom prst="rect">
+            <a:avLst/>
+          </a:prstGeom>
+        </p:spPr>
+      </p:pic>
     </p:spTree>
     <p:extLst>
       <p:ext uri="{BB962C8B-B14F-4D97-AF65-F5344CB8AC3E}">

</xml_diff>

<commit_message>
changed relationship table pic
</commit_message>
<xml_diff>
--- a/Revature Standards/Presentation.pptx
+++ b/Revature Standards/Presentation.pptx
@@ -41554,10 +41554,10 @@
       </p:sp>
       <p:pic>
         <p:nvPicPr>
-          <p:cNvPr id="10" name="Picture 9">
+          <p:cNvPr id="5" name="Picture 4">
             <a:extLst>
               <a:ext uri="{FF2B5EF4-FFF2-40B4-BE49-F238E27FC236}">
-                <a16:creationId xmlns:a16="http://schemas.microsoft.com/office/drawing/2014/main" id="{38B0CDE7-5B30-461B-A214-05BFDACEED51}"/>
+                <a16:creationId xmlns:a16="http://schemas.microsoft.com/office/drawing/2014/main" id="{489C0C30-40C8-43C2-8546-48C234ADFFC5}"/>
               </a:ext>
             </a:extLst>
           </p:cNvPr>
@@ -41574,8 +41574,8 @@
         </p:blipFill>
         <p:spPr>
           <a:xfrm>
-            <a:off x="701177" y="1346314"/>
-            <a:ext cx="7528423" cy="5421930"/>
+            <a:off x="1152226" y="1492564"/>
+            <a:ext cx="6933839" cy="4765211"/>
           </a:xfrm>
           <a:prstGeom prst="rect">
             <a:avLst/>

</xml_diff>

<commit_message>
Fixed my last name
</commit_message>
<xml_diff>
--- a/Revature Standards/Presentation.pptx
+++ b/Revature Standards/Presentation.pptx
@@ -265,6 +265,14 @@
     </p:ext>
   </p:extLst>
 </p:presentation>
+</file>
+
+<file path=ppt/revisionInfo.xml><?xml version="1.0" encoding="utf-8"?>
+<p1510:revInfo xmlns:a="http://schemas.openxmlformats.org/drawingml/2006/main" xmlns:r="http://schemas.openxmlformats.org/officeDocument/2006/relationships" xmlns:p1510="http://schemas.microsoft.com/office/powerpoint/2015/10/main">
+  <p1510:revLst>
+    <p1510:client id="{B47CC044-EFCD-EA43-F223-48011AFD01DE}" v="9" dt="2021-11-24T05:34:06.093"/>
+  </p1510:revLst>
+</p1510:revInfo>
 </file>
 
 <file path=ppt/diagrams/colors1.xml><?xml version="1.0" encoding="utf-8"?>
@@ -6006,6 +6014,7 @@
           <a:camera prst="orthographicFront"/>
           <a:lightRig rig="flat" dir="t"/>
         </a:scene3d>
+        <a:sp3d/>
       </dsp:spPr>
       <dsp:style>
         <a:lnRef idx="1">
@@ -39884,15 +39893,7 @@
             </a:pPr>
             <a:r>
               <a:rPr lang="en-US" sz="2000" dirty="0"/>
-              <a:t>Diana </a:t>
-            </a:r>
-            <a:r>
-              <a:rPr lang="en-US" sz="2000" dirty="0" err="1"/>
-              <a:t>Dinh</a:t>
-            </a:r>
-            <a:r>
-              <a:rPr lang="en-US" sz="2000" dirty="0"/>
-              <a:t>-Andrus (She/Her)</a:t>
+              <a:t>Diana Dinh-Andrus (She/Her)</a:t>
             </a:r>
           </a:p>
           <a:p>
@@ -40046,15 +40047,7 @@
             </a:r>
             <a:r>
               <a:rPr lang="en-US" sz="2000" dirty="0"/>
-              <a:t> </a:t>
-            </a:r>
-            <a:r>
-              <a:rPr lang="en-US" sz="2000" dirty="0" err="1"/>
-              <a:t>Huai</a:t>
-            </a:r>
-            <a:r>
-              <a:rPr lang="en-US" sz="2000" dirty="0"/>
-              <a:t> (He/Him)</a:t>
+              <a:t> Huai (He/Him)</a:t>
             </a:r>
           </a:p>
           <a:p>
@@ -40202,7 +40195,7 @@
             </a:pPr>
             <a:r>
               <a:rPr lang="en-US" sz="2000" dirty="0"/>
-              <a:t>James Camal (He/Him)</a:t>
+              <a:t>James Camel (He/Him)</a:t>
             </a:r>
           </a:p>
           <a:p>

</xml_diff>

<commit_message>
updated jenkins backend slide and added text on bugs
</commit_message>
<xml_diff>
--- a/Revature Standards/Presentation.pptx
+++ b/Revature Standards/Presentation.pptx
@@ -38160,50 +38160,6 @@
       </p:sp>
       <p:sp>
         <p:nvSpPr>
-          <p:cNvPr id="3" name="Text Placeholder 2">
-            <a:extLst>
-              <a:ext uri="{FF2B5EF4-FFF2-40B4-BE49-F238E27FC236}">
-                <a16:creationId xmlns:a16="http://schemas.microsoft.com/office/drawing/2014/main" id="{AAF974EB-AE2E-43F2-B327-DB51C42ABB75}"/>
-              </a:ext>
-            </a:extLst>
-          </p:cNvPr>
-          <p:cNvSpPr>
-            <a:spLocks noGrp="1"/>
-          </p:cNvSpPr>
-          <p:nvPr>
-            <p:ph type="body" idx="1"/>
-          </p:nvPr>
-        </p:nvSpPr>
-        <p:spPr/>
-        <p:txBody>
-          <a:bodyPr/>
-          <a:lstStyle/>
-          <a:p>
-            <a:r>
-              <a:rPr lang="de-DE" dirty="0"/>
-              <a:t>[Insert Jenkins </a:t>
-            </a:r>
-            <a:r>
-              <a:rPr lang="de-DE" dirty="0" err="1"/>
-              <a:t>info</a:t>
-            </a:r>
-            <a:r>
-              <a:rPr lang="de-DE" dirty="0"/>
-              <a:t> and </a:t>
-            </a:r>
-            <a:r>
-              <a:rPr lang="de-DE" dirty="0" err="1"/>
-              <a:t>visuals</a:t>
-            </a:r>
-            <a:r>
-              <a:rPr lang="de-DE" dirty="0"/>
-              <a:t>]</a:t>
-            </a:r>
-          </a:p>
-        </p:txBody>
-      </p:sp>
-      <p:sp>
-        <p:nvSpPr>
           <p:cNvPr id="4" name="Slide Number Placeholder 3">
             <a:extLst>
               <a:ext uri="{FF2B5EF4-FFF2-40B4-BE49-F238E27FC236}">
@@ -38240,6 +38196,36 @@
           </a:p>
         </p:txBody>
       </p:sp>
+      <p:pic>
+        <p:nvPicPr>
+          <p:cNvPr id="8" name="Picture 7">
+            <a:extLst>
+              <a:ext uri="{FF2B5EF4-FFF2-40B4-BE49-F238E27FC236}">
+                <a16:creationId xmlns:a16="http://schemas.microsoft.com/office/drawing/2014/main" id="{F2D91F34-2829-413E-A044-1B7ACEF580A6}"/>
+              </a:ext>
+            </a:extLst>
+          </p:cNvPr>
+          <p:cNvPicPr>
+            <a:picLocks noChangeAspect="1"/>
+          </p:cNvPicPr>
+          <p:nvPr/>
+        </p:nvPicPr>
+        <p:blipFill>
+          <a:blip r:embed="rId2"/>
+          <a:stretch>
+            <a:fillRect/>
+          </a:stretch>
+        </p:blipFill>
+        <p:spPr>
+          <a:xfrm>
+            <a:off x="205074" y="2467399"/>
+            <a:ext cx="8733852" cy="2023740"/>
+          </a:xfrm>
+          <a:prstGeom prst="rect">
+            <a:avLst/>
+          </a:prstGeom>
+        </p:spPr>
+      </p:pic>
     </p:spTree>
     <p:extLst>
       <p:ext uri="{BB962C8B-B14F-4D97-AF65-F5344CB8AC3E}">
@@ -38465,14 +38451,18 @@
           <a:p>
             <a:pPr lvl="1"/>
             <a:r>
-              <a:rPr lang="de-DE" dirty="0"/>
-              <a:t>Inconsistent adding of followers</a:t>
+              <a:rPr lang="de-DE"/>
+              <a:t>Adding additional follows inconsistent</a:t>
             </a:r>
           </a:p>
           <a:p>
             <a:r>
+              <a:rPr lang="de-DE"/>
+              <a:t>Post </a:t>
+            </a:r>
+            <a:r>
               <a:rPr lang="de-DE" dirty="0"/>
-              <a:t>Post cards width are reduced</a:t>
+              <a:t>feed and home container heights conflict</a:t>
             </a:r>
           </a:p>
           <a:p>

</xml_diff>